<commit_message>
Deploy website Thu Sep  8 12:55:23 PDT 2022
</commit_message>
<xml_diff>
--- a/assets/slides/fa22/05-HOFs.pptx
+++ b/assets/slides/fa22/05-HOFs.pptx
@@ -1284,7 +1284,7 @@
           </a:ln>
           <a:extLst>
             <a:ext uri="{909E8E84-426E-40dd-AFC4-6F175D3DCCD1}">
-              <a14:hiddenFill xmlns:a14="http://schemas.microsoft.com/office/drawing/2010/main" xmlns="">
+              <a14:hiddenFill xmlns="" xmlns:a14="http://schemas.microsoft.com/office/drawing/2010/main">
                 <a:noFill/>
               </a14:hiddenFill>
             </a:ext>
@@ -1325,14 +1325,14 @@
           </a:ln>
           <a:extLst>
             <a:ext uri="{909E8E84-426E-40dd-AFC4-6F175D3DCCD1}">
-              <a14:hiddenFill xmlns:a14="http://schemas.microsoft.com/office/drawing/2010/main" xmlns="">
+              <a14:hiddenFill xmlns="" xmlns:a14="http://schemas.microsoft.com/office/drawing/2010/main">
                 <a:solidFill>
                   <a:srgbClr val="FFFFFF"/>
                 </a:solidFill>
               </a14:hiddenFill>
             </a:ext>
             <a:ext uri="{91240B29-F687-4f45-9708-019B960494DF}">
-              <a14:hiddenLine xmlns:a14="http://schemas.microsoft.com/office/drawing/2010/main" xmlns="" w="9525">
+              <a14:hiddenLine xmlns="" xmlns:a14="http://schemas.microsoft.com/office/drawing/2010/main" w="9525">
                 <a:solidFill>
                   <a:srgbClr val="000000"/>
                 </a:solidFill>
@@ -1436,14 +1436,14 @@
           </a:ln>
           <a:extLst>
             <a:ext uri="{909E8E84-426E-40dd-AFC4-6F175D3DCCD1}">
-              <a14:hiddenFill xmlns:a14="http://schemas.microsoft.com/office/drawing/2010/main" xmlns="">
+              <a14:hiddenFill xmlns="" xmlns:a14="http://schemas.microsoft.com/office/drawing/2010/main">
                 <a:solidFill>
                   <a:srgbClr val="FFFFFF"/>
                 </a:solidFill>
               </a14:hiddenFill>
             </a:ext>
             <a:ext uri="{91240B29-F687-4f45-9708-019B960494DF}">
-              <a14:hiddenLine xmlns:a14="http://schemas.microsoft.com/office/drawing/2010/main" xmlns="" w="9525">
+              <a14:hiddenLine xmlns="" xmlns:a14="http://schemas.microsoft.com/office/drawing/2010/main" w="9525">
                 <a:solidFill>
                   <a:srgbClr val="000000"/>
                 </a:solidFill>
@@ -1453,7 +1453,7 @@
               </a14:hiddenLine>
             </a:ext>
             <a:ext uri="{FAA26D3D-D897-4be2-8F04-BA451C77F1D7}">
-              <ma14:placeholderFlag xmlns:ma14="http://schemas.microsoft.com/office/mac/drawingml/2011/main" xmlns="" val="1"/>
+              <ma14:placeholderFlag xmlns="" xmlns:ma14="http://schemas.microsoft.com/office/mac/drawingml/2011/main" val="1"/>
             </a:ext>
           </a:extLst>
         </p:spPr>
@@ -1791,14 +1791,14 @@
           </a:ln>
           <a:extLst>
             <a:ext uri="{909E8E84-426E-40dd-AFC4-6F175D3DCCD1}">
-              <a14:hiddenFill xmlns:a14="http://schemas.microsoft.com/office/drawing/2010/main" xmlns="">
+              <a14:hiddenFill xmlns="" xmlns:a14="http://schemas.microsoft.com/office/drawing/2010/main">
                 <a:solidFill>
                   <a:srgbClr val="FFFFFF"/>
                 </a:solidFill>
               </a14:hiddenFill>
             </a:ext>
             <a:ext uri="{91240B29-F687-4f45-9708-019B960494DF}">
-              <a14:hiddenLine xmlns:a14="http://schemas.microsoft.com/office/drawing/2010/main" xmlns="" w="9525">
+              <a14:hiddenLine xmlns="" xmlns:a14="http://schemas.microsoft.com/office/drawing/2010/main" w="9525">
                 <a:solidFill>
                   <a:srgbClr val="000000"/>
                 </a:solidFill>
@@ -1808,7 +1808,7 @@
               </a14:hiddenLine>
             </a:ext>
             <a:ext uri="{FAA26D3D-D897-4be2-8F04-BA451C77F1D7}">
-              <ma14:placeholderFlag xmlns:ma14="http://schemas.microsoft.com/office/mac/drawingml/2011/main" xmlns="" val="1"/>
+              <ma14:placeholderFlag xmlns="" xmlns:ma14="http://schemas.microsoft.com/office/mac/drawingml/2011/main" val="1"/>
             </a:ext>
           </a:extLst>
         </p:spPr>
@@ -4363,14 +4363,14 @@
           </a:ln>
           <a:extLst>
             <a:ext uri="{909E8E84-426E-40dd-AFC4-6F175D3DCCD1}">
-              <a14:hiddenFill xmlns:a14="http://schemas.microsoft.com/office/drawing/2010/main" xmlns="">
+              <a14:hiddenFill xmlns="" xmlns:a14="http://schemas.microsoft.com/office/drawing/2010/main">
                 <a:solidFill>
                   <a:srgbClr val="FFFFFF"/>
                 </a:solidFill>
               </a14:hiddenFill>
             </a:ext>
             <a:ext uri="{91240B29-F687-4f45-9708-019B960494DF}">
-              <a14:hiddenLine xmlns:a14="http://schemas.microsoft.com/office/drawing/2010/main" xmlns="" w="9525">
+              <a14:hiddenLine xmlns="" xmlns:a14="http://schemas.microsoft.com/office/drawing/2010/main" w="9525">
                 <a:solidFill>
                   <a:srgbClr val="000000"/>
                 </a:solidFill>
@@ -4380,7 +4380,7 @@
               </a14:hiddenLine>
             </a:ext>
             <a:ext uri="{FAA26D3D-D897-4be2-8F04-BA451C77F1D7}">
-              <ma14:placeholderFlag xmlns:ma14="http://schemas.microsoft.com/office/mac/drawingml/2011/main" xmlns="" val="1"/>
+              <ma14:placeholderFlag xmlns="" xmlns:ma14="http://schemas.microsoft.com/office/mac/drawingml/2011/main" val="1"/>
             </a:ext>
           </a:extLst>
         </p:spPr>
@@ -4424,14 +4424,14 @@
           </a:ln>
           <a:extLst>
             <a:ext uri="{909E8E84-426E-40dd-AFC4-6F175D3DCCD1}">
-              <a14:hiddenFill xmlns:a14="http://schemas.microsoft.com/office/drawing/2010/main" xmlns="">
+              <a14:hiddenFill xmlns="" xmlns:a14="http://schemas.microsoft.com/office/drawing/2010/main">
                 <a:solidFill>
                   <a:srgbClr val="FFFFFF"/>
                 </a:solidFill>
               </a14:hiddenFill>
             </a:ext>
             <a:ext uri="{91240B29-F687-4f45-9708-019B960494DF}">
-              <a14:hiddenLine xmlns:a14="http://schemas.microsoft.com/office/drawing/2010/main" xmlns="" w="9525">
+              <a14:hiddenLine xmlns="" xmlns:a14="http://schemas.microsoft.com/office/drawing/2010/main" w="9525">
                 <a:solidFill>
                   <a:srgbClr val="000000"/>
                 </a:solidFill>
@@ -4441,7 +4441,7 @@
               </a14:hiddenLine>
             </a:ext>
             <a:ext uri="{FAA26D3D-D897-4be2-8F04-BA451C77F1D7}">
-              <ma14:placeholderFlag xmlns:ma14="http://schemas.microsoft.com/office/mac/drawingml/2011/main" xmlns="" val="1"/>
+              <ma14:placeholderFlag xmlns="" xmlns:ma14="http://schemas.microsoft.com/office/mac/drawingml/2011/main" val="1"/>
             </a:ext>
           </a:extLst>
         </p:spPr>
@@ -4546,7 +4546,7 @@
           </a:ln>
           <a:extLst>
             <a:ext uri="{909E8E84-426E-40dd-AFC4-6F175D3DCCD1}">
-              <a14:hiddenFill xmlns:a14="http://schemas.microsoft.com/office/drawing/2010/main" xmlns="">
+              <a14:hiddenFill xmlns="" xmlns:a14="http://schemas.microsoft.com/office/drawing/2010/main">
                 <a:noFill/>
               </a14:hiddenFill>
             </a:ext>
@@ -4587,14 +4587,14 @@
           </a:ln>
           <a:extLst>
             <a:ext uri="{909E8E84-426E-40dd-AFC4-6F175D3DCCD1}">
-              <a14:hiddenFill xmlns:a14="http://schemas.microsoft.com/office/drawing/2010/main" xmlns="">
+              <a14:hiddenFill xmlns="" xmlns:a14="http://schemas.microsoft.com/office/drawing/2010/main">
                 <a:solidFill>
                   <a:srgbClr val="FFFFFF"/>
                 </a:solidFill>
               </a14:hiddenFill>
             </a:ext>
             <a:ext uri="{91240B29-F687-4f45-9708-019B960494DF}">
-              <a14:hiddenLine xmlns:a14="http://schemas.microsoft.com/office/drawing/2010/main" xmlns="" w="9525">
+              <a14:hiddenLine xmlns="" xmlns:a14="http://schemas.microsoft.com/office/drawing/2010/main" w="9525">
                 <a:solidFill>
                   <a:srgbClr val="000000"/>
                 </a:solidFill>
@@ -4634,14 +4634,14 @@
           </a:ln>
           <a:extLst>
             <a:ext uri="{909E8E84-426E-40dd-AFC4-6F175D3DCCD1}">
-              <a14:hiddenFill xmlns:a14="http://schemas.microsoft.com/office/drawing/2010/main" xmlns="">
+              <a14:hiddenFill xmlns="" xmlns:a14="http://schemas.microsoft.com/office/drawing/2010/main">
                 <a:solidFill>
                   <a:srgbClr val="FFFFFF"/>
                 </a:solidFill>
               </a14:hiddenFill>
             </a:ext>
             <a:ext uri="{91240B29-F687-4f45-9708-019B960494DF}">
-              <a14:hiddenLine xmlns:a14="http://schemas.microsoft.com/office/drawing/2010/main" xmlns="" w="9525">
+              <a14:hiddenLine xmlns="" xmlns:a14="http://schemas.microsoft.com/office/drawing/2010/main" w="9525">
                 <a:solidFill>
                   <a:srgbClr val="000000"/>
                 </a:solidFill>
@@ -4651,7 +4651,7 @@
               </a14:hiddenLine>
             </a:ext>
             <a:ext uri="{FAA26D3D-D897-4be2-8F04-BA451C77F1D7}">
-              <ma14:placeholderFlag xmlns:ma14="http://schemas.microsoft.com/office/mac/drawingml/2011/main" xmlns="" val="1"/>
+              <ma14:placeholderFlag xmlns="" xmlns:ma14="http://schemas.microsoft.com/office/mac/drawingml/2011/main" val="1"/>
             </a:ext>
           </a:extLst>
         </p:spPr>
@@ -5342,14 +5342,26 @@
             <p:ph type="ctrTitle"/>
           </p:nvPr>
         </p:nvSpPr>
-        <p:spPr/>
+        <p:spPr>
+          <a:xfrm>
+            <a:off x="2652132" y="2693987"/>
+            <a:ext cx="8458200" cy="1470025"/>
+          </a:xfrm>
+        </p:spPr>
         <p:txBody>
           <a:bodyPr/>
           <a:lstStyle/>
           <a:p>
             <a:r>
               <a:rPr lang="en-US" dirty="0"/>
-              <a:t>Week 3: HOFs</a:t>
+              <a:t>Lecture 5</a:t>
+            </a:r>
+            <a:br>
+              <a:rPr lang="en-US" dirty="0"/>
+            </a:br>
+            <a:r>
+              <a:rPr lang="en-US" dirty="0"/>
+              <a:t>Higher Order Functions</a:t>
             </a:r>
           </a:p>
         </p:txBody>
@@ -7663,34 +7675,23 @@
           <a:p>
             <a:r>
               <a:rPr lang="en-US" dirty="0"/>
-              <a:t> Watch Ed for announcements</a:t>
+              <a:t> Do watch Ed for announcements</a:t>
             </a:r>
           </a:p>
           <a:p>
             <a:pPr lvl="1"/>
             <a:r>
               <a:rPr lang="en-US" dirty="0"/>
-              <a:t> One form all assignment extensions</a:t>
+              <a:t>  Please remember to pick the best category when asking questions</a:t>
             </a:r>
           </a:p>
           <a:p>
             <a:pPr lvl="1"/>
-            <a:r>
-              <a:rPr lang="en-US" i="1" dirty="0"/>
-              <a:t>Please don't fill this out for slip days.</a:t>
-            </a:r>
-          </a:p>
-          <a:p>
-            <a:pPr lvl="1"/>
-            <a:r>
-              <a:rPr lang="en-US" dirty="0"/>
-              <a:t>If you need up to 3 days, just submit late. </a:t>
-            </a:r>
             <a:r>
               <a:rPr lang="en-US" dirty="0">
                 <a:sym typeface="Wingdings" pitchFamily="2" charset="2"/>
               </a:rPr>
-              <a:t></a:t>
+              <a:t> Use the Python code option</a:t>
             </a:r>
           </a:p>
           <a:p>
@@ -7698,7 +7699,7 @@
               <a:rPr lang="en-US" dirty="0">
                 <a:sym typeface="Wingdings" pitchFamily="2" charset="2"/>
               </a:rPr>
-              <a:t>CSM sections are out tomorrow</a:t>
+              <a:t>CSM section sign ups are out </a:t>
             </a:r>
           </a:p>
           <a:p>
@@ -7709,7 +7710,53 @@
               </a:rPr>
               <a:t> Totally optional, but lots of good prep.</a:t>
             </a:r>
-            <a:endParaRPr lang="en-US" dirty="0"/>
+          </a:p>
+          <a:p>
+            <a:r>
+              <a:rPr lang="en-US" dirty="0">
+                <a:sym typeface="Wingdings" pitchFamily="2" charset="2"/>
+              </a:rPr>
+              <a:t>Tutor-Led Small group sections</a:t>
+            </a:r>
+          </a:p>
+          <a:p>
+            <a:pPr lvl="1"/>
+            <a:r>
+              <a:rPr lang="en-US" dirty="0">
+                <a:sym typeface="Wingdings" pitchFamily="2" charset="2"/>
+              </a:rPr>
+              <a:t> Review</a:t>
+            </a:r>
+          </a:p>
+          <a:p>
+            <a:pPr lvl="1"/>
+            <a:r>
+              <a:rPr lang="en-US" dirty="0">
+                <a:sym typeface="Wingdings" pitchFamily="2" charset="2"/>
+              </a:rPr>
+              <a:t>Exam Prep </a:t>
+            </a:r>
+          </a:p>
+          <a:p>
+            <a:r>
+              <a:rPr lang="en-US" dirty="0">
+                <a:sym typeface="Wingdings" pitchFamily="2" charset="2"/>
+              </a:rPr>
+              <a:t>Check the C88C google calendar</a:t>
+            </a:r>
+          </a:p>
+          <a:p>
+            <a:endParaRPr lang="en-US" dirty="0">
+              <a:sym typeface="Wingdings" pitchFamily="2" charset="2"/>
+            </a:endParaRPr>
+          </a:p>
+          <a:p>
+            <a:r>
+              <a:rPr lang="en-US" dirty="0">
+                <a:sym typeface="Wingdings" pitchFamily="2" charset="2"/>
+              </a:rPr>
+              <a:t>Still working on the waitlist. (LOL sigh, same announcement 4X in a row!)</a:t>
+            </a:r>
           </a:p>
         </p:txBody>
       </p:sp>

</xml_diff>